<commit_message>
create: ngix 에러 처리
</commit_message>
<xml_diff>
--- a/Article/redis/redis_데이터_한번에_삭제/img/img.pptx
+++ b/Article/redis/redis_데이터_한번에_삭제/img/img.pptx
@@ -3429,18 +3429,11 @@
               <a:t>Redis </a:t>
             </a:r>
             <a:r>
-              <a:rPr kumimoji="1" lang="ko-KR" altLang="en-US" sz="3200" b="1" dirty="0" err="1">
-                <a:latin typeface="Noto Sans KR" panose="020B0500000000000000" pitchFamily="34" charset="-128"/>
-                <a:ea typeface="Noto Sans KR" panose="020B0500000000000000" pitchFamily="34" charset="-128"/>
-              </a:rPr>
-              <a:t>복수키</a:t>
-            </a:r>
-            <a:r>
               <a:rPr kumimoji="1" lang="ko-KR" altLang="en-US" sz="3200" b="1" dirty="0">
                 <a:latin typeface="Noto Sans KR" panose="020B0500000000000000" pitchFamily="34" charset="-128"/>
                 <a:ea typeface="Noto Sans KR" panose="020B0500000000000000" pitchFamily="34" charset="-128"/>
               </a:rPr>
-              <a:t> 한 번에 삭제</a:t>
+              <a:t>데이터 한 번에 삭제</a:t>
             </a:r>
           </a:p>
         </p:txBody>

</xml_diff>